<commit_message>
Syl updt + slide 1-6
</commit_message>
<xml_diff>
--- a/slides-steve/Chapter 02.pptx
+++ b/slides-steve/Chapter 02.pptx
@@ -156,6 +156,22 @@
       </a:defRPr>
     </a:lvl9pPr>
   </p:defaultTextStyle>
+  <p:extLst>
+    <p:ext uri="{EFAFB233-063F-42B5-8137-9DF3F51BA10A}">
+      <p15:sldGuideLst xmlns:p15="http://schemas.microsoft.com/office/powerpoint/2012/main">
+        <p15:guide id="1" orient="horz" pos="2160">
+          <p15:clr>
+            <a:srgbClr val="A4A3A4"/>
+          </p15:clr>
+        </p15:guide>
+        <p15:guide id="2" pos="2880">
+          <p15:clr>
+            <a:srgbClr val="A4A3A4"/>
+          </p15:clr>
+        </p15:guide>
+      </p15:sldGuideLst>
+    </p:ext>
+  </p:extLst>
 </p:presentation>
 </file>
 
@@ -241,7 +257,7 @@
           <a:p>
             <a:fld id="{FD4A7BD2-1837-0D4A-B8C2-780A3C701BE3}" type="datetimeFigureOut">
               <a:rPr lang="en-US" smtClean="0"/>
-              <a:t>10/6/15</a:t>
+              <a:t>8/30/16</a:t>
             </a:fld>
             <a:endParaRPr lang="en-US"/>
           </a:p>
@@ -407,7 +423,7 @@
           <a:p>
             <a:fld id="{ECB70A9C-85D1-774D-A472-C73F480B692A}" type="datetimeFigureOut">
               <a:rPr lang="en-US" smtClean="0"/>
-              <a:t>10/6/15</a:t>
+              <a:t>8/30/16</a:t>
             </a:fld>
             <a:endParaRPr lang="en-US"/>
           </a:p>
@@ -3283,8 +3299,12 @@
           <a:lstStyle/>
           <a:p>
             <a:r>
-              <a:rPr lang="en-US" dirty="0" smtClean="0"/>
-              <a:t>Chapter Two</a:t>
+              <a:rPr lang="en-US" smtClean="0"/>
+              <a:t>Chapter </a:t>
+            </a:r>
+            <a:r>
+              <a:rPr lang="en-US"/>
+              <a:t>2</a:t>
             </a:r>
             <a:endParaRPr lang="en-US" dirty="0"/>
           </a:p>
@@ -3340,7 +3360,7 @@
   <p:timing>
     <p:tnLst>
       <p:par>
-        <p:cTn xmlns:p14="http://schemas.microsoft.com/office/powerpoint/2010/main" id="1" dur="indefinite" restart="never" nodeType="tmRoot"/>
+        <p:cTn id="1" dur="indefinite" restart="never" nodeType="tmRoot"/>
       </p:par>
     </p:tnLst>
   </p:timing>
@@ -3615,7 +3635,7 @@
   <p:timing>
     <p:tnLst>
       <p:par>
-        <p:cTn xmlns:p14="http://schemas.microsoft.com/office/powerpoint/2010/main" id="1" dur="indefinite" restart="never" nodeType="tmRoot"/>
+        <p:cTn id="1" dur="indefinite" restart="never" nodeType="tmRoot"/>
       </p:par>
     </p:tnLst>
   </p:timing>
@@ -3787,7 +3807,7 @@
   <p:timing>
     <p:tnLst>
       <p:par>
-        <p:cTn xmlns:p14="http://schemas.microsoft.com/office/powerpoint/2010/main" id="1" dur="indefinite" restart="never" nodeType="tmRoot"/>
+        <p:cTn id="1" dur="indefinite" restart="never" nodeType="tmRoot"/>
       </p:par>
     </p:tnLst>
   </p:timing>
@@ -4191,7 +4211,7 @@
   <p:timing>
     <p:tnLst>
       <p:par>
-        <p:cTn xmlns:p14="http://schemas.microsoft.com/office/powerpoint/2010/main" id="1" dur="indefinite" restart="never" nodeType="tmRoot"/>
+        <p:cTn id="1" dur="indefinite" restart="never" nodeType="tmRoot"/>
       </p:par>
     </p:tnLst>
   </p:timing>
@@ -4876,7 +4896,7 @@
   <p:timing>
     <p:tnLst>
       <p:par>
-        <p:cTn xmlns:p14="http://schemas.microsoft.com/office/powerpoint/2010/main" id="1" dur="indefinite" restart="never" nodeType="tmRoot"/>
+        <p:cTn id="1" dur="indefinite" restart="never" nodeType="tmRoot"/>
       </p:par>
     </p:tnLst>
   </p:timing>
@@ -5040,7 +5060,7 @@
   <p:timing>
     <p:tnLst>
       <p:par>
-        <p:cTn xmlns:p14="http://schemas.microsoft.com/office/powerpoint/2010/main" id="1" dur="indefinite" restart="never" nodeType="tmRoot"/>
+        <p:cTn id="1" dur="indefinite" restart="never" nodeType="tmRoot"/>
       </p:par>
     </p:tnLst>
   </p:timing>
@@ -5444,7 +5464,7 @@
   <p:timing>
     <p:tnLst>
       <p:par>
-        <p:cTn xmlns:p14="http://schemas.microsoft.com/office/powerpoint/2010/main" id="1" dur="indefinite" restart="never" nodeType="tmRoot"/>
+        <p:cTn id="1" dur="indefinite" restart="never" nodeType="tmRoot"/>
       </p:par>
     </p:tnLst>
   </p:timing>
@@ -5787,7 +5807,7 @@
   <p:timing>
     <p:tnLst>
       <p:par>
-        <p:cTn xmlns:p14="http://schemas.microsoft.com/office/powerpoint/2010/main" id="1" dur="indefinite" restart="never" nodeType="tmRoot"/>
+        <p:cTn id="1" dur="indefinite" restart="never" nodeType="tmRoot"/>
       </p:par>
     </p:tnLst>
   </p:timing>
@@ -5953,7 +5973,7 @@
   <p:timing>
     <p:tnLst>
       <p:par>
-        <p:cTn xmlns:p14="http://schemas.microsoft.com/office/powerpoint/2010/main" id="1" dur="indefinite" restart="never" nodeType="tmRoot"/>
+        <p:cTn id="1" dur="indefinite" restart="never" nodeType="tmRoot"/>
       </p:par>
     </p:tnLst>
   </p:timing>
@@ -6119,7 +6139,7 @@
   <p:timing>
     <p:tnLst>
       <p:par>
-        <p:cTn xmlns:p14="http://schemas.microsoft.com/office/powerpoint/2010/main" id="1" dur="indefinite" restart="never" nodeType="tmRoot"/>
+        <p:cTn id="1" dur="indefinite" restart="never" nodeType="tmRoot"/>
       </p:par>
     </p:tnLst>
   </p:timing>
@@ -6340,7 +6360,7 @@
   <p:timing>
     <p:tnLst>
       <p:par>
-        <p:cTn xmlns:p14="http://schemas.microsoft.com/office/powerpoint/2010/main" id="1" dur="indefinite" restart="never" nodeType="tmRoot"/>
+        <p:cTn id="1" dur="indefinite" restart="never" nodeType="tmRoot"/>
       </p:par>
     </p:tnLst>
   </p:timing>
@@ -6546,7 +6566,7 @@
   <p:timing>
     <p:tnLst>
       <p:par>
-        <p:cTn xmlns:p14="http://schemas.microsoft.com/office/powerpoint/2010/main" id="1" dur="indefinite" restart="never" nodeType="tmRoot"/>
+        <p:cTn id="1" dur="indefinite" restart="never" nodeType="tmRoot"/>
       </p:par>
     </p:tnLst>
   </p:timing>
@@ -6744,7 +6764,7 @@
   <p:timing>
     <p:tnLst>
       <p:par>
-        <p:cTn xmlns:p14="http://schemas.microsoft.com/office/powerpoint/2010/main" id="1" dur="indefinite" restart="never" nodeType="tmRoot"/>
+        <p:cTn id="1" dur="indefinite" restart="never" nodeType="tmRoot"/>
       </p:par>
     </p:tnLst>
   </p:timing>
@@ -7008,7 +7028,7 @@
   <p:timing>
     <p:tnLst>
       <p:par>
-        <p:cTn xmlns:p14="http://schemas.microsoft.com/office/powerpoint/2010/main" id="1" dur="indefinite" restart="never" nodeType="tmRoot"/>
+        <p:cTn id="1" dur="indefinite" restart="never" nodeType="tmRoot"/>
       </p:par>
     </p:tnLst>
   </p:timing>
@@ -7187,7 +7207,7 @@
   <p:timing>
     <p:tnLst>
       <p:par>
-        <p:cTn xmlns:p14="http://schemas.microsoft.com/office/powerpoint/2010/main" id="1" dur="indefinite" restart="never" nodeType="tmRoot"/>
+        <p:cTn id="1" dur="indefinite" restart="never" nodeType="tmRoot"/>
       </p:par>
     </p:tnLst>
   </p:timing>
@@ -7370,7 +7390,7 @@
   <p:timing>
     <p:tnLst>
       <p:par>
-        <p:cTn xmlns:p14="http://schemas.microsoft.com/office/powerpoint/2010/main" id="1" dur="indefinite" restart="never" nodeType="tmRoot"/>
+        <p:cTn id="1" dur="indefinite" restart="never" nodeType="tmRoot"/>
       </p:par>
     </p:tnLst>
   </p:timing>
@@ -7526,7 +7546,7 @@
   <p:timing>
     <p:tnLst>
       <p:par>
-        <p:cTn xmlns:p14="http://schemas.microsoft.com/office/powerpoint/2010/main" id="1" dur="indefinite" restart="never" nodeType="tmRoot"/>
+        <p:cTn id="1" dur="indefinite" restart="never" nodeType="tmRoot"/>
       </p:par>
     </p:tnLst>
   </p:timing>
@@ -7698,7 +7718,7 @@
   <p:timing>
     <p:tnLst>
       <p:par>
-        <p:cTn xmlns:p14="http://schemas.microsoft.com/office/powerpoint/2010/main" id="1" dur="indefinite" restart="never" nodeType="tmRoot"/>
+        <p:cTn id="1" dur="indefinite" restart="never" nodeType="tmRoot"/>
       </p:par>
     </p:tnLst>
   </p:timing>
@@ -7854,7 +7874,7 @@
   <p:timing>
     <p:tnLst>
       <p:par>
-        <p:cTn xmlns:p14="http://schemas.microsoft.com/office/powerpoint/2010/main" id="1" dur="indefinite" restart="never" nodeType="tmRoot"/>
+        <p:cTn id="1" dur="indefinite" restart="never" nodeType="tmRoot"/>
       </p:par>
     </p:tnLst>
   </p:timing>
@@ -8036,7 +8056,7 @@
   <p:timing>
     <p:tnLst>
       <p:par>
-        <p:cTn xmlns:p14="http://schemas.microsoft.com/office/powerpoint/2010/main" id="1" dur="indefinite" restart="never" nodeType="tmRoot"/>
+        <p:cTn id="1" dur="indefinite" restart="never" nodeType="tmRoot"/>
       </p:par>
     </p:tnLst>
   </p:timing>
@@ -8287,7 +8307,7 @@
   <p:timing>
     <p:tnLst>
       <p:par>
-        <p:cTn xmlns:p14="http://schemas.microsoft.com/office/powerpoint/2010/main" id="1" dur="indefinite" restart="never" nodeType="tmRoot"/>
+        <p:cTn id="1" dur="indefinite" restart="never" nodeType="tmRoot"/>
       </p:par>
     </p:tnLst>
   </p:timing>
@@ -8486,7 +8506,7 @@
   <p:timing>
     <p:tnLst>
       <p:par>
-        <p:cTn xmlns:p14="http://schemas.microsoft.com/office/powerpoint/2010/main" id="1" dur="indefinite" restart="never" nodeType="tmRoot"/>
+        <p:cTn id="1" dur="indefinite" restart="never" nodeType="tmRoot"/>
       </p:par>
     </p:tnLst>
   </p:timing>
@@ -8843,7 +8863,7 @@
   <p:timing>
     <p:tnLst>
       <p:par>
-        <p:cTn xmlns:p14="http://schemas.microsoft.com/office/powerpoint/2010/main" id="1" dur="indefinite" restart="never" nodeType="tmRoot"/>
+        <p:cTn id="1" dur="indefinite" restart="never" nodeType="tmRoot"/>
       </p:par>
     </p:tnLst>
   </p:timing>
@@ -9046,7 +9066,7 @@
   <p:timing>
     <p:tnLst>
       <p:par>
-        <p:cTn xmlns:p14="http://schemas.microsoft.com/office/powerpoint/2010/main" id="1" dur="indefinite" restart="never" nodeType="tmRoot"/>
+        <p:cTn id="1" dur="indefinite" restart="never" nodeType="tmRoot"/>
       </p:par>
     </p:tnLst>
   </p:timing>
@@ -9233,7 +9253,7 @@
   <p:timing>
     <p:tnLst>
       <p:par>
-        <p:cTn xmlns:p14="http://schemas.microsoft.com/office/powerpoint/2010/main" id="1" dur="indefinite" restart="never" nodeType="tmRoot"/>
+        <p:cTn id="1" dur="indefinite" restart="never" nodeType="tmRoot"/>
       </p:par>
     </p:tnLst>
   </p:timing>
@@ -9425,7 +9445,7 @@
   <p:timing>
     <p:tnLst>
       <p:par>
-        <p:cTn xmlns:p14="http://schemas.microsoft.com/office/powerpoint/2010/main" id="1" dur="indefinite" restart="never" nodeType="tmRoot"/>
+        <p:cTn id="1" dur="indefinite" restart="never" nodeType="tmRoot"/>
       </p:par>
     </p:tnLst>
   </p:timing>
@@ -9633,7 +9653,7 @@
   <p:timing>
     <p:tnLst>
       <p:par>
-        <p:cTn xmlns:p14="http://schemas.microsoft.com/office/powerpoint/2010/main" id="1" dur="indefinite" restart="never" nodeType="tmRoot"/>
+        <p:cTn id="1" dur="indefinite" restart="never" nodeType="tmRoot"/>
       </p:par>
     </p:tnLst>
   </p:timing>
@@ -9799,7 +9819,7 @@
   <p:timing>
     <p:tnLst>
       <p:par>
-        <p:cTn xmlns:p14="http://schemas.microsoft.com/office/powerpoint/2010/main" id="1" dur="indefinite" restart="never" nodeType="tmRoot"/>
+        <p:cTn id="1" dur="indefinite" restart="never" nodeType="tmRoot"/>
       </p:par>
     </p:tnLst>
   </p:timing>
@@ -10015,7 +10035,7 @@
   <p:timing>
     <p:tnLst>
       <p:par>
-        <p:cTn xmlns:p14="http://schemas.microsoft.com/office/powerpoint/2010/main" id="1" dur="indefinite" restart="never" nodeType="tmRoot"/>
+        <p:cTn id="1" dur="indefinite" restart="never" nodeType="tmRoot"/>
       </p:par>
     </p:tnLst>
   </p:timing>
@@ -10328,7 +10348,7 @@
   <p:timing>
     <p:tnLst>
       <p:par>
-        <p:cTn xmlns:p14="http://schemas.microsoft.com/office/powerpoint/2010/main" id="1" dur="indefinite" restart="never" nodeType="tmRoot"/>
+        <p:cTn id="1" dur="indefinite" restart="never" nodeType="tmRoot"/>
       </p:par>
     </p:tnLst>
   </p:timing>
@@ -10545,7 +10565,7 @@
   <p:timing>
     <p:tnLst>
       <p:par>
-        <p:cTn xmlns:p14="http://schemas.microsoft.com/office/powerpoint/2010/main" id="1" dur="indefinite" restart="never" nodeType="tmRoot"/>
+        <p:cTn id="1" dur="indefinite" restart="never" nodeType="tmRoot"/>
       </p:par>
     </p:tnLst>
   </p:timing>
@@ -10823,7 +10843,7 @@
   <p:timing>
     <p:tnLst>
       <p:par>
-        <p:cTn xmlns:p14="http://schemas.microsoft.com/office/powerpoint/2010/main" id="1" dur="indefinite" restart="never" nodeType="tmRoot"/>
+        <p:cTn id="1" dur="indefinite" restart="never" nodeType="tmRoot"/>
       </p:par>
     </p:tnLst>
   </p:timing>
@@ -11013,7 +11033,7 @@
   <p:timing>
     <p:tnLst>
       <p:par>
-        <p:cTn xmlns:p14="http://schemas.microsoft.com/office/powerpoint/2010/main" id="1" dur="indefinite" restart="never" nodeType="tmRoot"/>
+        <p:cTn id="1" dur="indefinite" restart="never" nodeType="tmRoot"/>
       </p:par>
     </p:tnLst>
   </p:timing>
@@ -11431,7 +11451,7 @@
   <p:timing>
     <p:tnLst>
       <p:par>
-        <p:cTn xmlns:p14="http://schemas.microsoft.com/office/powerpoint/2010/main" id="1" dur="indefinite" restart="never" nodeType="tmRoot"/>
+        <p:cTn id="1" dur="indefinite" restart="never" nodeType="tmRoot"/>
       </p:par>
     </p:tnLst>
   </p:timing>
@@ -11597,7 +11617,7 @@
   <p:timing>
     <p:tnLst>
       <p:par>
-        <p:cTn xmlns:p14="http://schemas.microsoft.com/office/powerpoint/2010/main" id="1" dur="indefinite" restart="never" nodeType="tmRoot"/>
+        <p:cTn id="1" dur="indefinite" restart="never" nodeType="tmRoot"/>
       </p:par>
     </p:tnLst>
   </p:timing>
@@ -11893,7 +11913,7 @@
   <p:timing>
     <p:tnLst>
       <p:par>
-        <p:cTn xmlns:p14="http://schemas.microsoft.com/office/powerpoint/2010/main" id="1" dur="indefinite" restart="never" nodeType="tmRoot"/>
+        <p:cTn id="1" dur="indefinite" restart="never" nodeType="tmRoot"/>
       </p:par>
     </p:tnLst>
   </p:timing>
@@ -12082,7 +12102,7 @@
   <p:timing>
     <p:tnLst>
       <p:par>
-        <p:cTn xmlns:p14="http://schemas.microsoft.com/office/powerpoint/2010/main" id="1" dur="indefinite" restart="never" nodeType="tmRoot"/>
+        <p:cTn id="1" dur="indefinite" restart="never" nodeType="tmRoot"/>
       </p:par>
     </p:tnLst>
   </p:timing>
@@ -12286,7 +12306,7 @@
   <p:timing>
     <p:tnLst>
       <p:par>
-        <p:cTn xmlns:p14="http://schemas.microsoft.com/office/powerpoint/2010/main" id="1" dur="indefinite" restart="never" nodeType="tmRoot"/>
+        <p:cTn id="1" dur="indefinite" restart="never" nodeType="tmRoot"/>
       </p:par>
     </p:tnLst>
   </p:timing>
@@ -12438,7 +12458,7 @@
   <p:timing>
     <p:tnLst>
       <p:par>
-        <p:cTn xmlns:p14="http://schemas.microsoft.com/office/powerpoint/2010/main" id="1" dur="indefinite" restart="never" nodeType="tmRoot"/>
+        <p:cTn id="1" dur="indefinite" restart="never" nodeType="tmRoot"/>
       </p:par>
     </p:tnLst>
   </p:timing>
@@ -12603,7 +12623,7 @@
   <p:timing>
     <p:tnLst>
       <p:par>
-        <p:cTn xmlns:p14="http://schemas.microsoft.com/office/powerpoint/2010/main" id="1" dur="indefinite" restart="never" nodeType="tmRoot"/>
+        <p:cTn id="1" dur="indefinite" restart="never" nodeType="tmRoot"/>
       </p:par>
     </p:tnLst>
   </p:timing>
@@ -12800,7 +12820,7 @@
   <p:timing>
     <p:tnLst>
       <p:par>
-        <p:cTn xmlns:p14="http://schemas.microsoft.com/office/powerpoint/2010/main" id="1" dur="indefinite" restart="never" nodeType="tmRoot"/>
+        <p:cTn id="1" dur="indefinite" restart="never" nodeType="tmRoot"/>
       </p:par>
     </p:tnLst>
   </p:timing>
@@ -12864,24 +12884,14 @@
           <a:p>
             <a:r>
               <a:rPr lang="en-US" dirty="0" smtClean="0"/>
-              <a:t>Questions: 1, </a:t>
-            </a:r>
-            <a:r>
-              <a:rPr lang="en-US" dirty="0" smtClean="0"/>
-              <a:t>3, 5, 7, 9 a b, 11 a b</a:t>
-            </a:r>
-            <a:endParaRPr lang="en-US" dirty="0" smtClean="0"/>
-          </a:p>
-          <a:p>
-            <a:r>
-              <a:rPr lang="en-US" dirty="0" smtClean="0"/>
-              <a:t>Exercises: </a:t>
-            </a:r>
-            <a:r>
-              <a:rPr lang="en-US" dirty="0" smtClean="0"/>
-              <a:t>1, 3, 6</a:t>
-            </a:r>
-            <a:endParaRPr lang="en-US" dirty="0" smtClean="0"/>
+              <a:t>Questions: 1, 3, 5, 7, 9 a b, 11 a b</a:t>
+            </a:r>
+          </a:p>
+          <a:p>
+            <a:r>
+              <a:rPr lang="en-US" dirty="0" smtClean="0"/>
+              <a:t>Exercises: 1, 3, 6</a:t>
+            </a:r>
           </a:p>
           <a:p>
             <a:r>
@@ -12890,11 +12900,7 @@
             </a:r>
             <a:r>
               <a:rPr lang="en-US" smtClean="0"/>
-              <a:t>: </a:t>
-            </a:r>
-            <a:r>
-              <a:rPr lang="en-US" smtClean="0"/>
-              <a:t>1, 3</a:t>
+              <a:t>: 1, 3</a:t>
             </a:r>
             <a:endParaRPr lang="en-US" dirty="0"/>
           </a:p>
@@ -13317,7 +13323,7 @@
   <p:timing>
     <p:tnLst>
       <p:par>
-        <p:cTn xmlns:p14="http://schemas.microsoft.com/office/powerpoint/2010/main" id="1" dur="indefinite" restart="never" nodeType="tmRoot"/>
+        <p:cTn id="1" dur="indefinite" restart="never" nodeType="tmRoot"/>
       </p:par>
     </p:tnLst>
   </p:timing>
@@ -13671,7 +13677,7 @@
   <p:timing>
     <p:tnLst>
       <p:par>
-        <p:cTn xmlns:p14="http://schemas.microsoft.com/office/powerpoint/2010/main" id="1" dur="indefinite" restart="never" nodeType="tmRoot"/>
+        <p:cTn id="1" dur="indefinite" restart="never" nodeType="tmRoot"/>
       </p:par>
     </p:tnLst>
   </p:timing>
@@ -14388,7 +14394,7 @@
   <p:timing>
     <p:tnLst>
       <p:par>
-        <p:cTn xmlns:p14="http://schemas.microsoft.com/office/powerpoint/2010/main" id="1" dur="indefinite" restart="never" nodeType="tmRoot"/>
+        <p:cTn id="1" dur="indefinite" restart="never" nodeType="tmRoot"/>
       </p:par>
     </p:tnLst>
   </p:timing>
@@ -15975,7 +15981,7 @@
   <p:timing>
     <p:tnLst>
       <p:par>
-        <p:cTn xmlns:p14="http://schemas.microsoft.com/office/powerpoint/2010/main" id="1" dur="indefinite" restart="never" nodeType="tmRoot"/>
+        <p:cTn id="1" dur="indefinite" restart="never" nodeType="tmRoot"/>
       </p:par>
     </p:tnLst>
   </p:timing>
@@ -16164,7 +16170,7 @@
   <p:timing>
     <p:tnLst>
       <p:par>
-        <p:cTn xmlns:p14="http://schemas.microsoft.com/office/powerpoint/2010/main" id="1" dur="indefinite" restart="never" nodeType="tmRoot"/>
+        <p:cTn id="1" dur="indefinite" restart="never" nodeType="tmRoot"/>
       </p:par>
     </p:tnLst>
   </p:timing>

</xml_diff>